<commit_message>
Add Mike Lombardi file
</commit_message>
<xml_diff>
--- a/psh on the river 2019/warner-az-commands-2019.pptx
+++ b/psh on the river 2019/warner-az-commands-2019.pptx
@@ -363,7 +363,7 @@
             <a:fld id="{B61BEF0D-F0BB-DE4B-95CE-6DB70DBA9567}" type="datetimeFigureOut">
               <a:rPr lang="en-US" smtClean="0"/>
               <a:pPr/>
-              <a:t>8/9/2019</a:t>
+              <a:t>8/10/2019</a:t>
             </a:fld>
             <a:endParaRPr lang="en-US" dirty="0"/>
           </a:p>
@@ -659,7 +659,7 @@
             <a:fld id="{B61BEF0D-F0BB-DE4B-95CE-6DB70DBA9567}" type="datetimeFigureOut">
               <a:rPr lang="en-US" smtClean="0"/>
               <a:pPr/>
-              <a:t>8/9/2019</a:t>
+              <a:t>8/10/2019</a:t>
             </a:fld>
             <a:endParaRPr lang="en-US" dirty="0"/>
           </a:p>
@@ -899,7 +899,7 @@
             <a:fld id="{B61BEF0D-F0BB-DE4B-95CE-6DB70DBA9567}" type="datetimeFigureOut">
               <a:rPr lang="en-US" smtClean="0"/>
               <a:pPr/>
-              <a:t>8/9/2019</a:t>
+              <a:t>8/10/2019</a:t>
             </a:fld>
             <a:endParaRPr lang="en-US" dirty="0"/>
           </a:p>
@@ -1149,7 +1149,7 @@
             <a:fld id="{B61BEF0D-F0BB-DE4B-95CE-6DB70DBA9567}" type="datetimeFigureOut">
               <a:rPr lang="en-US" smtClean="0"/>
               <a:pPr/>
-              <a:t>8/9/2019</a:t>
+              <a:t>8/10/2019</a:t>
             </a:fld>
             <a:endParaRPr lang="en-US" dirty="0"/>
           </a:p>
@@ -1460,7 +1460,7 @@
             <a:fld id="{B61BEF0D-F0BB-DE4B-95CE-6DB70DBA9567}" type="datetimeFigureOut">
               <a:rPr lang="en-US" smtClean="0"/>
               <a:pPr/>
-              <a:t>8/9/2019</a:t>
+              <a:t>8/10/2019</a:t>
             </a:fld>
             <a:endParaRPr lang="en-US" dirty="0"/>
           </a:p>
@@ -1767,7 +1767,7 @@
             <a:fld id="{B61BEF0D-F0BB-DE4B-95CE-6DB70DBA9567}" type="datetimeFigureOut">
               <a:rPr lang="en-US" smtClean="0"/>
               <a:pPr/>
-              <a:t>8/9/2019</a:t>
+              <a:t>8/10/2019</a:t>
             </a:fld>
             <a:endParaRPr lang="en-US" dirty="0"/>
           </a:p>
@@ -2194,7 +2194,7 @@
             <a:fld id="{B61BEF0D-F0BB-DE4B-95CE-6DB70DBA9567}" type="datetimeFigureOut">
               <a:rPr lang="en-US" smtClean="0"/>
               <a:pPr/>
-              <a:t>8/9/2019</a:t>
+              <a:t>8/10/2019</a:t>
             </a:fld>
             <a:endParaRPr lang="en-US" dirty="0"/>
           </a:p>
@@ -2294,7 +2294,7 @@
             <a:fld id="{B61BEF0D-F0BB-DE4B-95CE-6DB70DBA9567}" type="datetimeFigureOut">
               <a:rPr lang="en-US" smtClean="0"/>
               <a:pPr/>
-              <a:t>8/9/2019</a:t>
+              <a:t>8/10/2019</a:t>
             </a:fld>
             <a:endParaRPr lang="en-US" dirty="0"/>
           </a:p>
@@ -2461,7 +2461,7 @@
             <a:fld id="{B61BEF0D-F0BB-DE4B-95CE-6DB70DBA9567}" type="datetimeFigureOut">
               <a:rPr lang="en-US" smtClean="0"/>
               <a:pPr/>
-              <a:t>8/9/2019</a:t>
+              <a:t>8/10/2019</a:t>
             </a:fld>
             <a:endParaRPr lang="en-US" dirty="0"/>
           </a:p>
@@ -2844,7 +2844,7 @@
             <a:fld id="{B61BEF0D-F0BB-DE4B-95CE-6DB70DBA9567}" type="datetimeFigureOut">
               <a:rPr lang="en-US" smtClean="0"/>
               <a:pPr/>
-              <a:t>8/9/2019</a:t>
+              <a:t>8/10/2019</a:t>
             </a:fld>
             <a:endParaRPr lang="en-US" dirty="0"/>
           </a:p>
@@ -3138,7 +3138,7 @@
             <a:fld id="{B61BEF0D-F0BB-DE4B-95CE-6DB70DBA9567}" type="datetimeFigureOut">
               <a:rPr lang="en-US" smtClean="0"/>
               <a:pPr/>
-              <a:t>8/9/2019</a:t>
+              <a:t>8/10/2019</a:t>
             </a:fld>
             <a:endParaRPr lang="en-US" dirty="0"/>
           </a:p>
@@ -3353,7 +3353,7 @@
             <a:fld id="{B61BEF0D-F0BB-DE4B-95CE-6DB70DBA9567}" type="datetimeFigureOut">
               <a:rPr lang="en-US" smtClean="0"/>
               <a:pPr/>
-              <a:t>8/9/2019</a:t>
+              <a:t>8/10/2019</a:t>
             </a:fld>
             <a:endParaRPr lang="en-US" dirty="0"/>
           </a:p>
@@ -4063,7 +4063,7 @@
           <a:p>
             <a:r>
               <a:rPr lang="en-US" dirty="0"/>
-              <a:t>Techtrainertim.com</a:t>
+              <a:t>Timw.info</a:t>
             </a:r>
           </a:p>
         </p:txBody>
@@ -5003,6 +5003,87 @@
           </a:p>
         </p:txBody>
       </p:sp>
+      <p:sp>
+        <p:nvSpPr>
+          <p:cNvPr id="5" name="Rectangle 4">
+            <a:extLst>
+              <a:ext uri="{FF2B5EF4-FFF2-40B4-BE49-F238E27FC236}">
+                <a16:creationId xmlns:a16="http://schemas.microsoft.com/office/drawing/2014/main" id="{8914FA22-9EE1-4654-B971-42EB6D0F5E9A}"/>
+              </a:ext>
+            </a:extLst>
+          </p:cNvPr>
+          <p:cNvSpPr/>
+          <p:nvPr/>
+        </p:nvSpPr>
+        <p:spPr>
+          <a:xfrm>
+            <a:off x="1479550" y="2875002"/>
+            <a:ext cx="9232899" cy="1107996"/>
+          </a:xfrm>
+          <a:prstGeom prst="rect">
+            <a:avLst/>
+          </a:prstGeom>
+          <a:noFill/>
+        </p:spPr>
+        <p:txBody>
+          <a:bodyPr wrap="square" lIns="91440" tIns="45720" rIns="91440" bIns="45720">
+            <a:spAutoFit/>
+          </a:bodyPr>
+          <a:lstStyle/>
+          <a:p>
+            <a:pPr algn="ctr"/>
+            <a:r>
+              <a:rPr lang="en-US" sz="6600" b="1" dirty="0" err="1">
+                <a:ln w="22225">
+                  <a:solidFill>
+                    <a:schemeClr val="accent2"/>
+                  </a:solidFill>
+                  <a:prstDash val="solid"/>
+                </a:ln>
+                <a:solidFill>
+                  <a:schemeClr val="accent2">
+                    <a:lumMod val="40000"/>
+                    <a:lumOff val="60000"/>
+                  </a:schemeClr>
+                </a:solidFill>
+              </a:rPr>
+              <a:t>PSScriptAnalyzer</a:t>
+            </a:r>
+            <a:r>
+              <a:rPr lang="en-US" sz="6600" b="1" dirty="0">
+                <a:ln w="22225">
+                  <a:solidFill>
+                    <a:schemeClr val="accent2"/>
+                  </a:solidFill>
+                  <a:prstDash val="solid"/>
+                </a:ln>
+                <a:solidFill>
+                  <a:schemeClr val="accent2">
+                    <a:lumMod val="40000"/>
+                    <a:lumOff val="60000"/>
+                  </a:schemeClr>
+                </a:solidFill>
+              </a:rPr>
+              <a:t> (!?)</a:t>
+            </a:r>
+            <a:endParaRPr lang="en-US" sz="6600" b="1" cap="none" spc="0" dirty="0">
+              <a:ln w="22225">
+                <a:solidFill>
+                  <a:schemeClr val="accent2"/>
+                </a:solidFill>
+                <a:prstDash val="solid"/>
+              </a:ln>
+              <a:solidFill>
+                <a:schemeClr val="accent2">
+                  <a:lumMod val="40000"/>
+                  <a:lumOff val="60000"/>
+                </a:schemeClr>
+              </a:solidFill>
+              <a:effectLst/>
+            </a:endParaRPr>
+          </a:p>
+        </p:txBody>
+      </p:sp>
     </p:spTree>
     <p:extLst>
       <p:ext uri="{BB962C8B-B14F-4D97-AF65-F5344CB8AC3E}">
@@ -5013,6 +5094,84 @@
   <p:clrMapOvr>
     <a:masterClrMapping/>
   </p:clrMapOvr>
+  <p:timing>
+    <p:tnLst>
+      <p:par>
+        <p:cTn id="1" dur="indefinite" restart="never" nodeType="tmRoot">
+          <p:childTnLst>
+            <p:seq concurrent="1" nextAc="seek">
+              <p:cTn id="2" dur="indefinite" nodeType="mainSeq">
+                <p:childTnLst>
+                  <p:par>
+                    <p:cTn id="3" fill="hold">
+                      <p:stCondLst>
+                        <p:cond delay="indefinite"/>
+                      </p:stCondLst>
+                      <p:childTnLst>
+                        <p:par>
+                          <p:cTn id="4" fill="hold">
+                            <p:stCondLst>
+                              <p:cond delay="0"/>
+                            </p:stCondLst>
+                            <p:childTnLst>
+                              <p:par>
+                                <p:cTn id="5" presetID="1" presetClass="entr" presetSubtype="0" fill="hold" grpId="0" nodeType="clickEffect">
+                                  <p:stCondLst>
+                                    <p:cond delay="0"/>
+                                  </p:stCondLst>
+                                  <p:childTnLst>
+                                    <p:set>
+                                      <p:cBhvr>
+                                        <p:cTn id="6" dur="1" fill="hold">
+                                          <p:stCondLst>
+                                            <p:cond delay="0"/>
+                                          </p:stCondLst>
+                                        </p:cTn>
+                                        <p:tgtEl>
+                                          <p:spTgt spid="5"/>
+                                        </p:tgtEl>
+                                        <p:attrNameLst>
+                                          <p:attrName>style.visibility</p:attrName>
+                                        </p:attrNameLst>
+                                      </p:cBhvr>
+                                      <p:to>
+                                        <p:strVal val="visible"/>
+                                      </p:to>
+                                    </p:set>
+                                  </p:childTnLst>
+                                </p:cTn>
+                              </p:par>
+                            </p:childTnLst>
+                          </p:cTn>
+                        </p:par>
+                      </p:childTnLst>
+                    </p:cTn>
+                  </p:par>
+                </p:childTnLst>
+              </p:cTn>
+              <p:prevCondLst>
+                <p:cond evt="onPrev" delay="0">
+                  <p:tgtEl>
+                    <p:sldTgt/>
+                  </p:tgtEl>
+                </p:cond>
+              </p:prevCondLst>
+              <p:nextCondLst>
+                <p:cond evt="onNext" delay="0">
+                  <p:tgtEl>
+                    <p:sldTgt/>
+                  </p:tgtEl>
+                </p:cond>
+              </p:nextCondLst>
+            </p:seq>
+          </p:childTnLst>
+        </p:cTn>
+      </p:par>
+    </p:tnLst>
+    <p:bldLst>
+      <p:bldP spid="5" grpId="0"/>
+    </p:bldLst>
+  </p:timing>
 </p:sld>
 </file>
 

</xml_diff>